<commit_message>
Varianta aprox finala a prezentarii
Signed-off-by: Alin-Romeo Tudose <alintudose126@gmail.com>
</commit_message>
<xml_diff>
--- a/Documentatie/Prezentare_Disertatie_Tudose_Alin.pptx
+++ b/Documentatie/Prezentare_Disertatie_Tudose_Alin.pptx
@@ -12,10 +12,13 @@
     <p:sldId id="266" r:id="rId6"/>
     <p:sldId id="261" r:id="rId7"/>
     <p:sldId id="260" r:id="rId8"/>
-    <p:sldId id="259" r:id="rId9"/>
-    <p:sldId id="264" r:id="rId10"/>
-    <p:sldId id="263" r:id="rId11"/>
-    <p:sldId id="265" r:id="rId12"/>
+    <p:sldId id="267" r:id="rId9"/>
+    <p:sldId id="268" r:id="rId10"/>
+    <p:sldId id="270" r:id="rId11"/>
+    <p:sldId id="259" r:id="rId12"/>
+    <p:sldId id="264" r:id="rId13"/>
+    <p:sldId id="263" r:id="rId14"/>
+    <p:sldId id="265" r:id="rId15"/>
   </p:sldIdLst>
   <p:sldSz cx="9144000" cy="6858000" type="screen4x3"/>
   <p:notesSz cx="6858000" cy="9144000"/>
@@ -278,9 +281,9 @@
           <a:p>
             <a:fld id="{DD5CEE04-040A-4E00-B740-BEBACC3B837A}" type="datetimeFigureOut">
               <a:rPr lang="en-US" smtClean="0"/>
-              <a:t>2/18/2023</a:t>
+              <a:t>2/20/2023</a:t>
             </a:fld>
-            <a:endParaRPr lang="en-US"/>
+            <a:endParaRPr lang="en-US" dirty="0"/>
           </a:p>
         </p:txBody>
       </p:sp>
@@ -304,7 +307,7 @@
           <a:bodyPr/>
           <a:lstStyle/>
           <a:p>
-            <a:endParaRPr lang="en-US"/>
+            <a:endParaRPr lang="en-US" dirty="0"/>
           </a:p>
         </p:txBody>
       </p:sp>
@@ -332,7 +335,7 @@
               <a:rPr lang="en-US" smtClean="0"/>
               <a:t>‹#›</a:t>
             </a:fld>
-            <a:endParaRPr lang="en-US"/>
+            <a:endParaRPr lang="en-US" dirty="0"/>
           </a:p>
         </p:txBody>
       </p:sp>
@@ -378,7 +381,7 @@
           <a:lstStyle/>
           <a:p>
             <a:pPr algn="ctr" eaLnBrk="1" latinLnBrk="0" hangingPunct="1"/>
-            <a:endParaRPr kumimoji="0" lang="en-US"/>
+            <a:endParaRPr kumimoji="0" lang="en-US" dirty="0"/>
           </a:p>
         </p:txBody>
       </p:sp>
@@ -424,7 +427,7 @@
           <a:lstStyle/>
           <a:p>
             <a:pPr algn="ctr" eaLnBrk="1" latinLnBrk="0" hangingPunct="1"/>
-            <a:endParaRPr kumimoji="0" lang="en-US"/>
+            <a:endParaRPr kumimoji="0" lang="en-US" dirty="0"/>
           </a:p>
         </p:txBody>
       </p:sp>
@@ -470,7 +473,7 @@
           <a:lstStyle/>
           <a:p>
             <a:pPr algn="ctr" eaLnBrk="1" latinLnBrk="0" hangingPunct="1"/>
-            <a:endParaRPr kumimoji="0" lang="en-US"/>
+            <a:endParaRPr kumimoji="0" lang="en-US" dirty="0"/>
           </a:p>
         </p:txBody>
       </p:sp>
@@ -516,7 +519,7 @@
           <a:lstStyle/>
           <a:p>
             <a:pPr algn="ctr" eaLnBrk="1" latinLnBrk="0" hangingPunct="1"/>
-            <a:endParaRPr kumimoji="0" lang="en-US"/>
+            <a:endParaRPr kumimoji="0" lang="en-US" dirty="0"/>
           </a:p>
         </p:txBody>
       </p:sp>
@@ -636,9 +639,9 @@
           <a:p>
             <a:fld id="{DD5CEE04-040A-4E00-B740-BEBACC3B837A}" type="datetimeFigureOut">
               <a:rPr lang="en-US" smtClean="0"/>
-              <a:t>2/18/2023</a:t>
+              <a:t>2/20/2023</a:t>
             </a:fld>
-            <a:endParaRPr lang="en-US"/>
+            <a:endParaRPr lang="en-US" dirty="0"/>
           </a:p>
         </p:txBody>
       </p:sp>
@@ -657,7 +660,7 @@
           <a:bodyPr/>
           <a:lstStyle/>
           <a:p>
-            <a:endParaRPr lang="en-US"/>
+            <a:endParaRPr lang="en-US" dirty="0"/>
           </a:p>
         </p:txBody>
       </p:sp>
@@ -680,7 +683,7 @@
               <a:rPr lang="en-US" smtClean="0"/>
               <a:t>‹#›</a:t>
             </a:fld>
-            <a:endParaRPr lang="en-US"/>
+            <a:endParaRPr lang="en-US" dirty="0"/>
           </a:p>
         </p:txBody>
       </p:sp>
@@ -810,9 +813,9 @@
           <a:p>
             <a:fld id="{DD5CEE04-040A-4E00-B740-BEBACC3B837A}" type="datetimeFigureOut">
               <a:rPr lang="en-US" smtClean="0"/>
-              <a:t>2/18/2023</a:t>
+              <a:t>2/20/2023</a:t>
             </a:fld>
-            <a:endParaRPr lang="en-US"/>
+            <a:endParaRPr lang="en-US" dirty="0"/>
           </a:p>
         </p:txBody>
       </p:sp>
@@ -831,7 +834,7 @@
           <a:bodyPr/>
           <a:lstStyle/>
           <a:p>
-            <a:endParaRPr lang="en-US"/>
+            <a:endParaRPr lang="en-US" dirty="0"/>
           </a:p>
         </p:txBody>
       </p:sp>
@@ -854,7 +857,7 @@
               <a:rPr lang="en-US" smtClean="0"/>
               <a:t>‹#›</a:t>
             </a:fld>
-            <a:endParaRPr lang="en-US"/>
+            <a:endParaRPr lang="en-US" dirty="0"/>
           </a:p>
         </p:txBody>
       </p:sp>
@@ -890,7 +893,7 @@
           <a:bodyPr vert="horz" wrap="square" lIns="91440" tIns="45720" rIns="91440" bIns="45720" anchor="t" compatLnSpc="1"/>
           <a:lstStyle/>
           <a:p>
-            <a:endParaRPr kumimoji="0" lang="en-US"/>
+            <a:endParaRPr kumimoji="0" lang="en-US" dirty="0"/>
           </a:p>
         </p:txBody>
       </p:sp>
@@ -940,7 +943,7 @@
           <a:lstStyle/>
           <a:p>
             <a:pPr algn="ctr" eaLnBrk="1" latinLnBrk="0" hangingPunct="1"/>
-            <a:endParaRPr kumimoji="0" lang="en-US"/>
+            <a:endParaRPr kumimoji="0" lang="en-US" dirty="0"/>
           </a:p>
         </p:txBody>
       </p:sp>
@@ -976,7 +979,7 @@
           <a:bodyPr vert="horz" wrap="square" lIns="91440" tIns="45720" rIns="91440" bIns="45720" anchor="t" compatLnSpc="1"/>
           <a:lstStyle/>
           <a:p>
-            <a:endParaRPr kumimoji="0" lang="en-US"/>
+            <a:endParaRPr kumimoji="0" lang="en-US" dirty="0"/>
           </a:p>
         </p:txBody>
       </p:sp>
@@ -1325,9 +1328,9 @@
           <a:p>
             <a:fld id="{DD5CEE04-040A-4E00-B740-BEBACC3B837A}" type="datetimeFigureOut">
               <a:rPr lang="en-US" smtClean="0"/>
-              <a:t>2/18/2023</a:t>
+              <a:t>2/20/2023</a:t>
             </a:fld>
-            <a:endParaRPr lang="en-US"/>
+            <a:endParaRPr lang="en-US" dirty="0"/>
           </a:p>
         </p:txBody>
       </p:sp>
@@ -1351,7 +1354,7 @@
           <a:bodyPr/>
           <a:lstStyle/>
           <a:p>
-            <a:endParaRPr lang="en-US"/>
+            <a:endParaRPr lang="en-US" dirty="0"/>
           </a:p>
         </p:txBody>
       </p:sp>
@@ -1379,7 +1382,7 @@
               <a:rPr lang="en-US" smtClean="0"/>
               <a:t>‹#›</a:t>
             </a:fld>
-            <a:endParaRPr lang="en-US"/>
+            <a:endParaRPr lang="en-US" dirty="0"/>
           </a:p>
         </p:txBody>
       </p:sp>
@@ -1425,7 +1428,7 @@
           <a:lstStyle/>
           <a:p>
             <a:pPr algn="ctr" eaLnBrk="1" latinLnBrk="0" hangingPunct="1"/>
-            <a:endParaRPr kumimoji="0" lang="en-US"/>
+            <a:endParaRPr kumimoji="0" lang="en-US" dirty="0"/>
           </a:p>
         </p:txBody>
       </p:sp>
@@ -1471,7 +1474,7 @@
           <a:lstStyle/>
           <a:p>
             <a:pPr algn="ctr" eaLnBrk="1" latinLnBrk="0" hangingPunct="1"/>
-            <a:endParaRPr kumimoji="0" lang="en-US"/>
+            <a:endParaRPr kumimoji="0" lang="en-US" dirty="0"/>
           </a:p>
         </p:txBody>
       </p:sp>
@@ -1544,9 +1547,9 @@
           <a:p>
             <a:fld id="{DD5CEE04-040A-4E00-B740-BEBACC3B837A}" type="datetimeFigureOut">
               <a:rPr lang="en-US" smtClean="0"/>
-              <a:t>2/18/2023</a:t>
+              <a:t>2/20/2023</a:t>
             </a:fld>
-            <a:endParaRPr lang="en-US"/>
+            <a:endParaRPr lang="en-US" dirty="0"/>
           </a:p>
         </p:txBody>
       </p:sp>
@@ -1565,7 +1568,7 @@
           <a:bodyPr/>
           <a:lstStyle/>
           <a:p>
-            <a:endParaRPr lang="en-US"/>
+            <a:endParaRPr lang="en-US" dirty="0"/>
           </a:p>
         </p:txBody>
       </p:sp>
@@ -1588,7 +1591,7 @@
               <a:rPr lang="en-US" smtClean="0"/>
               <a:t>‹#›</a:t>
             </a:fld>
-            <a:endParaRPr lang="en-US"/>
+            <a:endParaRPr lang="en-US" dirty="0"/>
           </a:p>
         </p:txBody>
       </p:sp>
@@ -1895,9 +1898,9 @@
           <a:p>
             <a:fld id="{DD5CEE04-040A-4E00-B740-BEBACC3B837A}" type="datetimeFigureOut">
               <a:rPr lang="en-US" smtClean="0"/>
-              <a:t>2/18/2023</a:t>
+              <a:t>2/20/2023</a:t>
             </a:fld>
-            <a:endParaRPr lang="en-US"/>
+            <a:endParaRPr lang="en-US" dirty="0"/>
           </a:p>
         </p:txBody>
       </p:sp>
@@ -1916,7 +1919,7 @@
           <a:bodyPr/>
           <a:lstStyle/>
           <a:p>
-            <a:endParaRPr lang="en-US"/>
+            <a:endParaRPr lang="en-US" dirty="0"/>
           </a:p>
         </p:txBody>
       </p:sp>
@@ -1939,7 +1942,7 @@
               <a:rPr lang="en-US" smtClean="0"/>
               <a:t>‹#›</a:t>
             </a:fld>
-            <a:endParaRPr lang="en-US"/>
+            <a:endParaRPr lang="en-US" dirty="0"/>
           </a:p>
         </p:txBody>
       </p:sp>
@@ -2126,9 +2129,9 @@
           <a:p>
             <a:fld id="{DD5CEE04-040A-4E00-B740-BEBACC3B837A}" type="datetimeFigureOut">
               <a:rPr lang="en-US" smtClean="0"/>
-              <a:t>2/18/2023</a:t>
+              <a:t>2/20/2023</a:t>
             </a:fld>
-            <a:endParaRPr lang="en-US"/>
+            <a:endParaRPr lang="en-US" dirty="0"/>
           </a:p>
         </p:txBody>
       </p:sp>
@@ -2147,7 +2150,7 @@
           <a:bodyPr/>
           <a:lstStyle/>
           <a:p>
-            <a:endParaRPr lang="en-US"/>
+            <a:endParaRPr lang="en-US" dirty="0"/>
           </a:p>
         </p:txBody>
       </p:sp>
@@ -2170,7 +2173,7 @@
               <a:rPr lang="en-US" smtClean="0"/>
               <a:t>‹#›</a:t>
             </a:fld>
-            <a:endParaRPr lang="en-US"/>
+            <a:endParaRPr lang="en-US" dirty="0"/>
           </a:p>
         </p:txBody>
       </p:sp>
@@ -2220,7 +2223,7 @@
           <a:lstStyle/>
           <a:p>
             <a:pPr algn="ctr" eaLnBrk="1" latinLnBrk="0" hangingPunct="1"/>
-            <a:endParaRPr kumimoji="0" lang="en-US"/>
+            <a:endParaRPr kumimoji="0" lang="en-US" dirty="0"/>
           </a:p>
         </p:txBody>
       </p:sp>
@@ -2266,9 +2269,9 @@
           <a:p>
             <a:fld id="{DD5CEE04-040A-4E00-B740-BEBACC3B837A}" type="datetimeFigureOut">
               <a:rPr lang="en-US" smtClean="0"/>
-              <a:t>2/18/2023</a:t>
+              <a:t>2/20/2023</a:t>
             </a:fld>
-            <a:endParaRPr lang="en-US"/>
+            <a:endParaRPr lang="en-US" dirty="0"/>
           </a:p>
         </p:txBody>
       </p:sp>
@@ -2287,7 +2290,7 @@
           <a:bodyPr/>
           <a:lstStyle/>
           <a:p>
-            <a:endParaRPr lang="en-US"/>
+            <a:endParaRPr lang="en-US" dirty="0"/>
           </a:p>
         </p:txBody>
       </p:sp>
@@ -2310,7 +2313,7 @@
               <a:rPr lang="en-US" smtClean="0"/>
               <a:t>‹#›</a:t>
             </a:fld>
-            <a:endParaRPr lang="en-US"/>
+            <a:endParaRPr lang="en-US" dirty="0"/>
           </a:p>
         </p:txBody>
       </p:sp>
@@ -2346,7 +2349,7 @@
           <a:bodyPr vert="horz" wrap="square" lIns="91440" tIns="45720" rIns="91440" bIns="45720" anchor="t" compatLnSpc="1"/>
           <a:lstStyle/>
           <a:p>
-            <a:endParaRPr kumimoji="0" lang="en-US"/>
+            <a:endParaRPr kumimoji="0" lang="en-US" dirty="0"/>
           </a:p>
         </p:txBody>
       </p:sp>
@@ -2396,7 +2399,7 @@
           <a:lstStyle/>
           <a:p>
             <a:pPr algn="ctr" eaLnBrk="1" latinLnBrk="0" hangingPunct="1"/>
-            <a:endParaRPr kumimoji="0" lang="en-US"/>
+            <a:endParaRPr kumimoji="0" lang="en-US" dirty="0"/>
           </a:p>
         </p:txBody>
       </p:sp>
@@ -2542,9 +2545,9 @@
           <a:p>
             <a:fld id="{DD5CEE04-040A-4E00-B740-BEBACC3B837A}" type="datetimeFigureOut">
               <a:rPr lang="en-US" smtClean="0"/>
-              <a:t>2/18/2023</a:t>
+              <a:t>2/20/2023</a:t>
             </a:fld>
-            <a:endParaRPr lang="en-US"/>
+            <a:endParaRPr lang="en-US" dirty="0"/>
           </a:p>
         </p:txBody>
       </p:sp>
@@ -2563,7 +2566,7 @@
           <a:bodyPr/>
           <a:lstStyle/>
           <a:p>
-            <a:endParaRPr lang="en-US"/>
+            <a:endParaRPr lang="en-US" dirty="0"/>
           </a:p>
         </p:txBody>
       </p:sp>
@@ -2586,7 +2589,7 @@
               <a:rPr lang="en-US" smtClean="0"/>
               <a:t>‹#›</a:t>
             </a:fld>
-            <a:endParaRPr lang="en-US"/>
+            <a:endParaRPr lang="en-US" dirty="0"/>
           </a:p>
         </p:txBody>
       </p:sp>
@@ -2622,7 +2625,7 @@
           <a:bodyPr vert="horz" wrap="square" lIns="91440" tIns="45720" rIns="91440" bIns="45720" anchor="t" compatLnSpc="1"/>
           <a:lstStyle/>
           <a:p>
-            <a:endParaRPr kumimoji="0" lang="en-US"/>
+            <a:endParaRPr kumimoji="0" lang="en-US" dirty="0"/>
           </a:p>
         </p:txBody>
       </p:sp>
@@ -2708,7 +2711,7 @@
           <a:lstStyle/>
           <a:p>
             <a:pPr algn="ctr" eaLnBrk="1" latinLnBrk="0" hangingPunct="1"/>
-            <a:endParaRPr kumimoji="0" lang="en-US"/>
+            <a:endParaRPr kumimoji="0" lang="en-US" dirty="0"/>
           </a:p>
         </p:txBody>
       </p:sp>
@@ -2878,10 +2881,9 @@
           </a:lstStyle>
           <a:p>
             <a:r>
-              <a:rPr kumimoji="0" lang="en-US"/>
+              <a:rPr kumimoji="0" lang="en-US" dirty="0"/>
               <a:t>Click icon to add picture</a:t>
             </a:r>
-            <a:endParaRPr kumimoji="0" lang="en-US" dirty="0"/>
           </a:p>
         </p:txBody>
       </p:sp>
@@ -2948,9 +2950,9 @@
           <a:p>
             <a:fld id="{DD5CEE04-040A-4E00-B740-BEBACC3B837A}" type="datetimeFigureOut">
               <a:rPr lang="en-US" smtClean="0"/>
-              <a:t>2/18/2023</a:t>
+              <a:t>2/20/2023</a:t>
             </a:fld>
-            <a:endParaRPr lang="en-US"/>
+            <a:endParaRPr lang="en-US" dirty="0"/>
           </a:p>
         </p:txBody>
       </p:sp>
@@ -2969,7 +2971,7 @@
           <a:bodyPr/>
           <a:lstStyle/>
           <a:p>
-            <a:endParaRPr lang="en-US"/>
+            <a:endParaRPr lang="en-US" dirty="0"/>
           </a:p>
         </p:txBody>
       </p:sp>
@@ -2992,7 +2994,7 @@
               <a:rPr lang="en-US" smtClean="0"/>
               <a:t>‹#›</a:t>
             </a:fld>
-            <a:endParaRPr lang="en-US"/>
+            <a:endParaRPr lang="en-US" dirty="0"/>
           </a:p>
         </p:txBody>
       </p:sp>
@@ -3028,7 +3030,7 @@
           <a:bodyPr vert="horz" wrap="square" lIns="91440" tIns="45720" rIns="91440" bIns="45720" anchor="t" compatLnSpc="1"/>
           <a:lstStyle/>
           <a:p>
-            <a:endParaRPr kumimoji="0" lang="en-US"/>
+            <a:endParaRPr kumimoji="0" lang="en-US" dirty="0"/>
           </a:p>
         </p:txBody>
       </p:sp>
@@ -3078,7 +3080,7 @@
           <a:lstStyle/>
           <a:p>
             <a:pPr algn="ctr" eaLnBrk="1" latinLnBrk="0" hangingPunct="1"/>
-            <a:endParaRPr kumimoji="0" lang="en-US"/>
+            <a:endParaRPr kumimoji="0" lang="en-US" dirty="0"/>
           </a:p>
         </p:txBody>
       </p:sp>
@@ -3124,7 +3126,7 @@
           <a:lstStyle/>
           <a:p>
             <a:pPr algn="ctr" eaLnBrk="1" latinLnBrk="0" hangingPunct="1"/>
-            <a:endParaRPr kumimoji="0" lang="en-US"/>
+            <a:endParaRPr kumimoji="0" lang="en-US" dirty="0"/>
           </a:p>
         </p:txBody>
       </p:sp>
@@ -3284,9 +3286,9 @@
           <a:p>
             <a:fld id="{DD5CEE04-040A-4E00-B740-BEBACC3B837A}" type="datetimeFigureOut">
               <a:rPr lang="en-US" smtClean="0"/>
-              <a:t>2/18/2023</a:t>
+              <a:t>2/20/2023</a:t>
             </a:fld>
-            <a:endParaRPr lang="en-US"/>
+            <a:endParaRPr lang="en-US" dirty="0"/>
           </a:p>
         </p:txBody>
       </p:sp>
@@ -3321,7 +3323,7 @@
             </a:lvl1pPr>
           </a:lstStyle>
           <a:p>
-            <a:endParaRPr lang="en-US"/>
+            <a:endParaRPr lang="en-US" dirty="0"/>
           </a:p>
         </p:txBody>
       </p:sp>
@@ -3360,7 +3362,7 @@
               <a:rPr lang="en-US" smtClean="0"/>
               <a:t>‹#›</a:t>
             </a:fld>
-            <a:endParaRPr lang="en-US"/>
+            <a:endParaRPr lang="en-US" dirty="0"/>
           </a:p>
         </p:txBody>
       </p:sp>
@@ -3396,7 +3398,7 @@
           <a:bodyPr vert="horz" wrap="square" lIns="91440" tIns="45720" rIns="91440" bIns="45720" anchor="t" compatLnSpc="1"/>
           <a:lstStyle/>
           <a:p>
-            <a:endParaRPr kumimoji="0" lang="en-US"/>
+            <a:endParaRPr kumimoji="0" lang="en-US" dirty="0"/>
           </a:p>
         </p:txBody>
       </p:sp>
@@ -3432,7 +3434,7 @@
           <a:bodyPr vert="horz" wrap="square" lIns="91440" tIns="45720" rIns="91440" bIns="45720" anchor="t" compatLnSpc="1"/>
           <a:lstStyle/>
           <a:p>
-            <a:endParaRPr kumimoji="0" lang="en-US"/>
+            <a:endParaRPr kumimoji="0" lang="en-US" dirty="0"/>
           </a:p>
         </p:txBody>
       </p:sp>
@@ -3482,7 +3484,7 @@
           <a:lstStyle/>
           <a:p>
             <a:pPr algn="ctr" eaLnBrk="1" latinLnBrk="0" hangingPunct="1"/>
-            <a:endParaRPr kumimoji="0" lang="en-US"/>
+            <a:endParaRPr kumimoji="0" lang="en-US" dirty="0"/>
           </a:p>
         </p:txBody>
       </p:sp>
@@ -4192,6 +4194,636 @@
                 <a:latin typeface="Times New Roman" pitchFamily="18" charset="0"/>
                 <a:cs typeface="Times New Roman" pitchFamily="18" charset="0"/>
               </a:rPr>
+              <a:t>Descriere soluție (4)</a:t>
+            </a:r>
+            <a:endParaRPr lang="en-US" b="1" dirty="0">
+              <a:solidFill>
+                <a:srgbClr val="0070C0"/>
+              </a:solidFill>
+              <a:latin typeface="Times New Roman" pitchFamily="18" charset="0"/>
+              <a:cs typeface="Times New Roman" pitchFamily="18" charset="0"/>
+            </a:endParaRPr>
+          </a:p>
+        </p:txBody>
+      </p:sp>
+      <p:sp>
+        <p:nvSpPr>
+          <p:cNvPr id="3" name="Content Placeholder 2"/>
+          <p:cNvSpPr>
+            <a:spLocks noGrp="1"/>
+          </p:cNvSpPr>
+          <p:nvPr>
+            <p:ph sz="quarter" idx="1"/>
+          </p:nvPr>
+        </p:nvSpPr>
+        <p:spPr/>
+        <p:txBody>
+          <a:bodyPr>
+            <a:normAutofit/>
+          </a:bodyPr>
+          <a:lstStyle/>
+          <a:p>
+            <a:r>
+              <a:rPr lang="ro-RO" dirty="0">
+                <a:latin typeface="Times New Roman" pitchFamily="18" charset="0"/>
+                <a:cs typeface="Times New Roman" pitchFamily="18" charset="0"/>
+              </a:rPr>
+              <a:t>Componenta UI:</a:t>
+            </a:r>
+          </a:p>
+          <a:p>
+            <a:endParaRPr lang="ro-RO" dirty="0">
+              <a:latin typeface="Times New Roman" pitchFamily="18" charset="0"/>
+              <a:cs typeface="Times New Roman" pitchFamily="18" charset="0"/>
+            </a:endParaRPr>
+          </a:p>
+          <a:p>
+            <a:pPr lvl="1"/>
+            <a:r>
+              <a:rPr lang="ro-RO" dirty="0">
+                <a:latin typeface="Times New Roman" pitchFamily="18" charset="0"/>
+                <a:cs typeface="Times New Roman" pitchFamily="18" charset="0"/>
+              </a:rPr>
+              <a:t>Intermediază comunicația între utilizator și componentele de extragere și validare;</a:t>
+            </a:r>
+          </a:p>
+          <a:p>
+            <a:pPr lvl="1"/>
+            <a:r>
+              <a:rPr lang="ro-RO" dirty="0">
+                <a:latin typeface="Times New Roman" pitchFamily="18" charset="0"/>
+                <a:cs typeface="Times New Roman" pitchFamily="18" charset="0"/>
+              </a:rPr>
+              <a:t>Afișează informațiile cerute către utilizator;</a:t>
+            </a:r>
+          </a:p>
+          <a:p>
+            <a:pPr lvl="1"/>
+            <a:r>
+              <a:rPr lang="ro-RO" dirty="0">
+                <a:latin typeface="Times New Roman" pitchFamily="18" charset="0"/>
+                <a:cs typeface="Times New Roman" pitchFamily="18" charset="0"/>
+              </a:rPr>
+              <a:t>Trimite cereri către celelalte componente pentru a obține informații.</a:t>
+            </a:r>
+          </a:p>
+        </p:txBody>
+      </p:sp>
+      <p:sp>
+        <p:nvSpPr>
+          <p:cNvPr id="6" name="TextBox 5"/>
+          <p:cNvSpPr txBox="1"/>
+          <p:nvPr/>
+        </p:nvSpPr>
+        <p:spPr>
+          <a:xfrm>
+            <a:off x="609600" y="6378129"/>
+            <a:ext cx="4724400" cy="307777"/>
+          </a:xfrm>
+          <a:prstGeom prst="rect">
+            <a:avLst/>
+          </a:prstGeom>
+          <a:noFill/>
+        </p:spPr>
+        <p:txBody>
+          <a:bodyPr wrap="square" rtlCol="0">
+            <a:spAutoFit/>
+          </a:bodyPr>
+          <a:lstStyle/>
+          <a:p>
+            <a:r>
+              <a:rPr lang="ro-RO" sz="1400" i="1" dirty="0">
+                <a:solidFill>
+                  <a:srgbClr val="0070C0"/>
+                </a:solidFill>
+              </a:rPr>
+              <a:t>Soluție client pentru interogarea și analiza de informații EUTL</a:t>
+            </a:r>
+          </a:p>
+        </p:txBody>
+      </p:sp>
+      <p:sp>
+        <p:nvSpPr>
+          <p:cNvPr id="7" name="TextBox 6"/>
+          <p:cNvSpPr txBox="1"/>
+          <p:nvPr/>
+        </p:nvSpPr>
+        <p:spPr>
+          <a:xfrm>
+            <a:off x="5486400" y="6378129"/>
+            <a:ext cx="3237515" cy="307777"/>
+          </a:xfrm>
+          <a:prstGeom prst="rect">
+            <a:avLst/>
+          </a:prstGeom>
+          <a:noFill/>
+        </p:spPr>
+        <p:txBody>
+          <a:bodyPr wrap="square" rtlCol="0">
+            <a:spAutoFit/>
+          </a:bodyPr>
+          <a:lstStyle/>
+          <a:p>
+            <a:r>
+              <a:rPr lang="ro-RO" sz="1400" i="1" dirty="0">
+                <a:solidFill>
+                  <a:srgbClr val="0070C0"/>
+                </a:solidFill>
+                <a:latin typeface="Times New Roman" pitchFamily="18" charset="0"/>
+                <a:cs typeface="Times New Roman" pitchFamily="18" charset="0"/>
+              </a:rPr>
+              <a:t>Slt. Ing. Alin-Romeo TUDOSE</a:t>
+            </a:r>
+          </a:p>
+        </p:txBody>
+      </p:sp>
+    </p:spTree>
+    <p:extLst>
+      <p:ext uri="{BB962C8B-B14F-4D97-AF65-F5344CB8AC3E}">
+        <p14:creationId xmlns:p14="http://schemas.microsoft.com/office/powerpoint/2010/main" val="1377147030"/>
+      </p:ext>
+    </p:extLst>
+  </p:cSld>
+  <p:clrMapOvr>
+    <a:masterClrMapping/>
+  </p:clrMapOvr>
+</p:sld>
+</file>
+
+<file path=ppt/slides/slide11.xml><?xml version="1.0" encoding="utf-8"?>
+<p:sld xmlns:a="http://schemas.openxmlformats.org/drawingml/2006/main" xmlns:r="http://schemas.openxmlformats.org/officeDocument/2006/relationships" xmlns:p="http://schemas.openxmlformats.org/presentationml/2006/main">
+  <p:cSld>
+    <p:spTree>
+      <p:nvGrpSpPr>
+        <p:cNvPr id="1" name=""/>
+        <p:cNvGrpSpPr/>
+        <p:nvPr/>
+      </p:nvGrpSpPr>
+      <p:grpSpPr>
+        <a:xfrm>
+          <a:off x="0" y="0"/>
+          <a:ext cx="0" cy="0"/>
+          <a:chOff x="0" y="0"/>
+          <a:chExt cx="0" cy="0"/>
+        </a:xfrm>
+      </p:grpSpPr>
+      <p:sp>
+        <p:nvSpPr>
+          <p:cNvPr id="2" name="Title 1"/>
+          <p:cNvSpPr>
+            <a:spLocks noGrp="1"/>
+          </p:cNvSpPr>
+          <p:nvPr>
+            <p:ph type="title"/>
+          </p:nvPr>
+        </p:nvSpPr>
+        <p:spPr/>
+        <p:txBody>
+          <a:bodyPr/>
+          <a:lstStyle/>
+          <a:p>
+            <a:r>
+              <a:rPr lang="ro-RO" b="1" dirty="0">
+                <a:solidFill>
+                  <a:srgbClr val="0070C0"/>
+                </a:solidFill>
+                <a:latin typeface="Times New Roman" pitchFamily="18" charset="0"/>
+                <a:cs typeface="Times New Roman" pitchFamily="18" charset="0"/>
+              </a:rPr>
+              <a:t>Tehnologii folosite</a:t>
+            </a:r>
+            <a:endParaRPr lang="en-US" b="1" dirty="0">
+              <a:solidFill>
+                <a:srgbClr val="0070C0"/>
+              </a:solidFill>
+              <a:latin typeface="Times New Roman" pitchFamily="18" charset="0"/>
+              <a:cs typeface="Times New Roman" pitchFamily="18" charset="0"/>
+            </a:endParaRPr>
+          </a:p>
+        </p:txBody>
+      </p:sp>
+      <p:sp>
+        <p:nvSpPr>
+          <p:cNvPr id="3" name="Content Placeholder 2"/>
+          <p:cNvSpPr>
+            <a:spLocks noGrp="1"/>
+          </p:cNvSpPr>
+          <p:nvPr>
+            <p:ph sz="quarter" idx="1"/>
+          </p:nvPr>
+        </p:nvSpPr>
+        <p:spPr/>
+        <p:txBody>
+          <a:bodyPr/>
+          <a:lstStyle/>
+          <a:p>
+            <a:r>
+              <a:rPr lang="ro-RO" dirty="0">
+                <a:latin typeface="Times New Roman" pitchFamily="18" charset="0"/>
+                <a:cs typeface="Times New Roman" pitchFamily="18" charset="0"/>
+              </a:rPr>
+              <a:t>Java;</a:t>
+            </a:r>
+          </a:p>
+          <a:p>
+            <a:r>
+              <a:rPr lang="ro-RO" dirty="0">
+                <a:latin typeface="Times New Roman" pitchFamily="18" charset="0"/>
+                <a:cs typeface="Times New Roman" pitchFamily="18" charset="0"/>
+              </a:rPr>
+              <a:t>Digital Signature Service (DSS library);</a:t>
+            </a:r>
+          </a:p>
+          <a:p>
+            <a:r>
+              <a:rPr lang="ro-RO" dirty="0">
+                <a:latin typeface="Times New Roman" pitchFamily="18" charset="0"/>
+                <a:cs typeface="Times New Roman" pitchFamily="18" charset="0"/>
+              </a:rPr>
+              <a:t>SpringBoot Framework (REST, Web MVC, IOC, Dependency Injection);</a:t>
+            </a:r>
+          </a:p>
+          <a:p>
+            <a:r>
+              <a:rPr lang="ro-RO" dirty="0">
+                <a:latin typeface="Times New Roman" pitchFamily="18" charset="0"/>
+                <a:cs typeface="Times New Roman" pitchFamily="18" charset="0"/>
+              </a:rPr>
+              <a:t>Thymeleaf;</a:t>
+            </a:r>
+          </a:p>
+          <a:p>
+            <a:r>
+              <a:rPr lang="ro-RO" dirty="0">
+                <a:latin typeface="Times New Roman" pitchFamily="18" charset="0"/>
+                <a:cs typeface="Times New Roman" pitchFamily="18" charset="0"/>
+              </a:rPr>
+              <a:t>Bootstrap;</a:t>
+            </a:r>
+          </a:p>
+          <a:p>
+            <a:r>
+              <a:rPr lang="ro-RO" dirty="0">
+                <a:latin typeface="Times New Roman" pitchFamily="18" charset="0"/>
+                <a:cs typeface="Times New Roman" pitchFamily="18" charset="0"/>
+              </a:rPr>
+              <a:t>HTML + CSS + JS.</a:t>
+            </a:r>
+          </a:p>
+          <a:p>
+            <a:endParaRPr lang="en-US" dirty="0">
+              <a:latin typeface="Times New Roman" pitchFamily="18" charset="0"/>
+              <a:cs typeface="Times New Roman" pitchFamily="18" charset="0"/>
+            </a:endParaRPr>
+          </a:p>
+        </p:txBody>
+      </p:sp>
+      <p:sp>
+        <p:nvSpPr>
+          <p:cNvPr id="6" name="TextBox 5"/>
+          <p:cNvSpPr txBox="1"/>
+          <p:nvPr/>
+        </p:nvSpPr>
+        <p:spPr>
+          <a:xfrm>
+            <a:off x="609600" y="6378129"/>
+            <a:ext cx="4724400" cy="307777"/>
+          </a:xfrm>
+          <a:prstGeom prst="rect">
+            <a:avLst/>
+          </a:prstGeom>
+          <a:noFill/>
+        </p:spPr>
+        <p:txBody>
+          <a:bodyPr wrap="square" rtlCol="0">
+            <a:spAutoFit/>
+          </a:bodyPr>
+          <a:lstStyle/>
+          <a:p>
+            <a:r>
+              <a:rPr lang="ro-RO" sz="1400" i="1" dirty="0">
+                <a:solidFill>
+                  <a:srgbClr val="0070C0"/>
+                </a:solidFill>
+              </a:rPr>
+              <a:t>Soluție client pentru interogarea și analiza de informații EUTL</a:t>
+            </a:r>
+          </a:p>
+        </p:txBody>
+      </p:sp>
+      <p:sp>
+        <p:nvSpPr>
+          <p:cNvPr id="7" name="TextBox 6"/>
+          <p:cNvSpPr txBox="1"/>
+          <p:nvPr/>
+        </p:nvSpPr>
+        <p:spPr>
+          <a:xfrm>
+            <a:off x="5486400" y="6378129"/>
+            <a:ext cx="3237515" cy="307777"/>
+          </a:xfrm>
+          <a:prstGeom prst="rect">
+            <a:avLst/>
+          </a:prstGeom>
+          <a:noFill/>
+        </p:spPr>
+        <p:txBody>
+          <a:bodyPr wrap="square" rtlCol="0">
+            <a:spAutoFit/>
+          </a:bodyPr>
+          <a:lstStyle/>
+          <a:p>
+            <a:r>
+              <a:rPr lang="ro-RO" sz="1400" i="1" dirty="0">
+                <a:solidFill>
+                  <a:srgbClr val="0070C0"/>
+                </a:solidFill>
+                <a:latin typeface="Times New Roman" pitchFamily="18" charset="0"/>
+                <a:cs typeface="Times New Roman" pitchFamily="18" charset="0"/>
+              </a:rPr>
+              <a:t>Slt. Ing. Alin-Romeo TUDOSE</a:t>
+            </a:r>
+          </a:p>
+        </p:txBody>
+      </p:sp>
+    </p:spTree>
+    <p:extLst>
+      <p:ext uri="{BB962C8B-B14F-4D97-AF65-F5344CB8AC3E}">
+        <p14:creationId xmlns:p14="http://schemas.microsoft.com/office/powerpoint/2010/main" val="3439825583"/>
+      </p:ext>
+    </p:extLst>
+  </p:cSld>
+  <p:clrMapOvr>
+    <a:masterClrMapping/>
+  </p:clrMapOvr>
+</p:sld>
+</file>
+
+<file path=ppt/slides/slide12.xml><?xml version="1.0" encoding="utf-8"?>
+<p:sld xmlns:a="http://schemas.openxmlformats.org/drawingml/2006/main" xmlns:r="http://schemas.openxmlformats.org/officeDocument/2006/relationships" xmlns:p="http://schemas.openxmlformats.org/presentationml/2006/main">
+  <p:cSld>
+    <p:spTree>
+      <p:nvGrpSpPr>
+        <p:cNvPr id="1" name=""/>
+        <p:cNvGrpSpPr/>
+        <p:nvPr/>
+      </p:nvGrpSpPr>
+      <p:grpSpPr>
+        <a:xfrm>
+          <a:off x="0" y="0"/>
+          <a:ext cx="0" cy="0"/>
+          <a:chOff x="0" y="0"/>
+          <a:chExt cx="0" cy="0"/>
+        </a:xfrm>
+      </p:grpSpPr>
+      <p:sp>
+        <p:nvSpPr>
+          <p:cNvPr id="2" name="Title 1"/>
+          <p:cNvSpPr>
+            <a:spLocks noGrp="1"/>
+          </p:cNvSpPr>
+          <p:nvPr>
+            <p:ph type="title"/>
+          </p:nvPr>
+        </p:nvSpPr>
+        <p:spPr/>
+        <p:txBody>
+          <a:bodyPr/>
+          <a:lstStyle/>
+          <a:p>
+            <a:r>
+              <a:rPr lang="ro-RO" b="1" dirty="0">
+                <a:solidFill>
+                  <a:srgbClr val="0070C0"/>
+                </a:solidFill>
+                <a:latin typeface="Times New Roman" pitchFamily="18" charset="0"/>
+                <a:cs typeface="Times New Roman" pitchFamily="18" charset="0"/>
+              </a:rPr>
+              <a:t>Rezultate testare</a:t>
+            </a:r>
+            <a:endParaRPr lang="en-US" b="1" dirty="0">
+              <a:solidFill>
+                <a:srgbClr val="0070C0"/>
+              </a:solidFill>
+              <a:latin typeface="Times New Roman" pitchFamily="18" charset="0"/>
+              <a:cs typeface="Times New Roman" pitchFamily="18" charset="0"/>
+            </a:endParaRPr>
+          </a:p>
+        </p:txBody>
+      </p:sp>
+      <p:sp>
+        <p:nvSpPr>
+          <p:cNvPr id="3" name="Content Placeholder 2"/>
+          <p:cNvSpPr>
+            <a:spLocks noGrp="1"/>
+          </p:cNvSpPr>
+          <p:nvPr>
+            <p:ph sz="quarter" idx="1"/>
+          </p:nvPr>
+        </p:nvSpPr>
+        <p:spPr/>
+        <p:txBody>
+          <a:bodyPr/>
+          <a:lstStyle/>
+          <a:p>
+            <a:r>
+              <a:rPr lang="ro-RO" dirty="0">
+                <a:latin typeface="Times New Roman" pitchFamily="18" charset="0"/>
+                <a:cs typeface="Times New Roman" pitchFamily="18" charset="0"/>
+              </a:rPr>
+              <a:t>Metode de testare folosite:</a:t>
+            </a:r>
+          </a:p>
+          <a:p>
+            <a:pPr lvl="1"/>
+            <a:r>
+              <a:rPr lang="ro-RO" dirty="0">
+                <a:latin typeface="Times New Roman" pitchFamily="18" charset="0"/>
+                <a:cs typeface="Times New Roman" pitchFamily="18" charset="0"/>
+              </a:rPr>
+              <a:t>Testare unitară</a:t>
+            </a:r>
+          </a:p>
+          <a:p>
+            <a:pPr lvl="1"/>
+            <a:r>
+              <a:rPr lang="ro-RO" dirty="0">
+                <a:latin typeface="Times New Roman" pitchFamily="18" charset="0"/>
+                <a:cs typeface="Times New Roman" pitchFamily="18" charset="0"/>
+              </a:rPr>
+              <a:t>Testare de integrare</a:t>
+            </a:r>
+          </a:p>
+          <a:p>
+            <a:pPr lvl="1"/>
+            <a:r>
+              <a:rPr lang="ro-RO" dirty="0">
+                <a:latin typeface="Times New Roman" pitchFamily="18" charset="0"/>
+                <a:cs typeface="Times New Roman" pitchFamily="18" charset="0"/>
+              </a:rPr>
+              <a:t>Testare closed-beta</a:t>
+            </a:r>
+          </a:p>
+          <a:p>
+            <a:pPr lvl="1"/>
+            <a:endParaRPr lang="ro-RO" dirty="0">
+              <a:latin typeface="Times New Roman" pitchFamily="18" charset="0"/>
+              <a:cs typeface="Times New Roman" pitchFamily="18" charset="0"/>
+            </a:endParaRPr>
+          </a:p>
+          <a:p>
+            <a:r>
+              <a:rPr lang="ro-RO" dirty="0">
+                <a:latin typeface="Times New Roman" pitchFamily="18" charset="0"/>
+                <a:cs typeface="Times New Roman" pitchFamily="18" charset="0"/>
+              </a:rPr>
+              <a:t>Performanțe generale mulțumitoare</a:t>
+            </a:r>
+          </a:p>
+          <a:p>
+            <a:endParaRPr lang="ro-RO" dirty="0">
+              <a:latin typeface="Times New Roman" pitchFamily="18" charset="0"/>
+              <a:cs typeface="Times New Roman" pitchFamily="18" charset="0"/>
+            </a:endParaRPr>
+          </a:p>
+          <a:p>
+            <a:r>
+              <a:rPr lang="ro-RO" dirty="0">
+                <a:latin typeface="Times New Roman" pitchFamily="18" charset="0"/>
+                <a:cs typeface="Times New Roman" pitchFamily="18" charset="0"/>
+              </a:rPr>
+              <a:t>Aplicația este ușor de folosit, nefiind întâlnite blocaje sau erori de către utilizatorii de test.</a:t>
+            </a:r>
+          </a:p>
+          <a:p>
+            <a:endParaRPr lang="ro-RO" dirty="0">
+              <a:latin typeface="Times New Roman" pitchFamily="18" charset="0"/>
+              <a:cs typeface="Times New Roman" pitchFamily="18" charset="0"/>
+            </a:endParaRPr>
+          </a:p>
+        </p:txBody>
+      </p:sp>
+      <p:sp>
+        <p:nvSpPr>
+          <p:cNvPr id="6" name="TextBox 5"/>
+          <p:cNvSpPr txBox="1"/>
+          <p:nvPr/>
+        </p:nvSpPr>
+        <p:spPr>
+          <a:xfrm>
+            <a:off x="609600" y="6378129"/>
+            <a:ext cx="4724400" cy="307777"/>
+          </a:xfrm>
+          <a:prstGeom prst="rect">
+            <a:avLst/>
+          </a:prstGeom>
+          <a:noFill/>
+        </p:spPr>
+        <p:txBody>
+          <a:bodyPr wrap="square" rtlCol="0">
+            <a:spAutoFit/>
+          </a:bodyPr>
+          <a:lstStyle/>
+          <a:p>
+            <a:r>
+              <a:rPr lang="ro-RO" sz="1400" i="1" dirty="0">
+                <a:solidFill>
+                  <a:srgbClr val="0070C0"/>
+                </a:solidFill>
+              </a:rPr>
+              <a:t>Soluție client pentru interogarea și analiza de informații EUTL</a:t>
+            </a:r>
+          </a:p>
+        </p:txBody>
+      </p:sp>
+      <p:sp>
+        <p:nvSpPr>
+          <p:cNvPr id="7" name="TextBox 6"/>
+          <p:cNvSpPr txBox="1"/>
+          <p:nvPr/>
+        </p:nvSpPr>
+        <p:spPr>
+          <a:xfrm>
+            <a:off x="5486400" y="6378129"/>
+            <a:ext cx="3237515" cy="307777"/>
+          </a:xfrm>
+          <a:prstGeom prst="rect">
+            <a:avLst/>
+          </a:prstGeom>
+          <a:noFill/>
+        </p:spPr>
+        <p:txBody>
+          <a:bodyPr wrap="square" rtlCol="0">
+            <a:spAutoFit/>
+          </a:bodyPr>
+          <a:lstStyle/>
+          <a:p>
+            <a:r>
+              <a:rPr lang="ro-RO" sz="1400" i="1" dirty="0">
+                <a:solidFill>
+                  <a:srgbClr val="0070C0"/>
+                </a:solidFill>
+                <a:latin typeface="Times New Roman" pitchFamily="18" charset="0"/>
+                <a:cs typeface="Times New Roman" pitchFamily="18" charset="0"/>
+              </a:rPr>
+              <a:t>Slt. Ing. Alin-Romeo TUDOSE</a:t>
+            </a:r>
+          </a:p>
+        </p:txBody>
+      </p:sp>
+    </p:spTree>
+    <p:extLst>
+      <p:ext uri="{BB962C8B-B14F-4D97-AF65-F5344CB8AC3E}">
+        <p14:creationId xmlns:p14="http://schemas.microsoft.com/office/powerpoint/2010/main" val="1329492536"/>
+      </p:ext>
+    </p:extLst>
+  </p:cSld>
+  <p:clrMapOvr>
+    <a:masterClrMapping/>
+  </p:clrMapOvr>
+</p:sld>
+</file>
+
+<file path=ppt/slides/slide13.xml><?xml version="1.0" encoding="utf-8"?>
+<p:sld xmlns:a="http://schemas.openxmlformats.org/drawingml/2006/main" xmlns:r="http://schemas.openxmlformats.org/officeDocument/2006/relationships" xmlns:p="http://schemas.openxmlformats.org/presentationml/2006/main">
+  <p:cSld>
+    <p:spTree>
+      <p:nvGrpSpPr>
+        <p:cNvPr id="1" name=""/>
+        <p:cNvGrpSpPr/>
+        <p:nvPr/>
+      </p:nvGrpSpPr>
+      <p:grpSpPr>
+        <a:xfrm>
+          <a:off x="0" y="0"/>
+          <a:ext cx="0" cy="0"/>
+          <a:chOff x="0" y="0"/>
+          <a:chExt cx="0" cy="0"/>
+        </a:xfrm>
+      </p:grpSpPr>
+      <p:sp>
+        <p:nvSpPr>
+          <p:cNvPr id="2" name="Title 1"/>
+          <p:cNvSpPr>
+            <a:spLocks noGrp="1"/>
+          </p:cNvSpPr>
+          <p:nvPr>
+            <p:ph type="title"/>
+          </p:nvPr>
+        </p:nvSpPr>
+        <p:spPr/>
+        <p:txBody>
+          <a:bodyPr/>
+          <a:lstStyle/>
+          <a:p>
+            <a:r>
+              <a:rPr lang="ro-RO" b="1" dirty="0">
+                <a:solidFill>
+                  <a:srgbClr val="0070C0"/>
+                </a:solidFill>
+                <a:latin typeface="Times New Roman" pitchFamily="18" charset="0"/>
+                <a:cs typeface="Times New Roman" pitchFamily="18" charset="0"/>
+              </a:rPr>
               <a:t>Concluzii</a:t>
             </a:r>
             <a:endParaRPr lang="en-US" b="1" dirty="0">
@@ -4340,7 +4972,7 @@
 </p:sld>
 </file>
 
-<file path=ppt/slides/slide11.xml><?xml version="1.0" encoding="utf-8"?>
+<file path=ppt/slides/slide14.xml><?xml version="1.0" encoding="utf-8"?>
 <p:sld xmlns:a="http://schemas.openxmlformats.org/drawingml/2006/main" xmlns:r="http://schemas.openxmlformats.org/officeDocument/2006/relationships" xmlns:p="http://schemas.openxmlformats.org/presentationml/2006/main">
   <p:cSld>
     <p:spTree>
@@ -5415,32 +6047,11 @@
           <a:p>
             <a:pPr lvl="1"/>
             <a:r>
-              <a:rPr lang="ro-RO" dirty="0" err="1">
-                <a:latin typeface="Times New Roman" pitchFamily="18" charset="0"/>
-                <a:cs typeface="Times New Roman" pitchFamily="18" charset="0"/>
-              </a:rPr>
-              <a:t>Repository</a:t>
-            </a:r>
-            <a:r>
               <a:rPr lang="ro-RO" dirty="0">
                 <a:latin typeface="Times New Roman" pitchFamily="18" charset="0"/>
                 <a:cs typeface="Times New Roman" pitchFamily="18" charset="0"/>
               </a:rPr>
-              <a:t> public de </a:t>
-            </a:r>
-            <a:r>
-              <a:rPr lang="ro-RO" dirty="0" err="1">
-                <a:latin typeface="Times New Roman" pitchFamily="18" charset="0"/>
-                <a:cs typeface="Times New Roman" pitchFamily="18" charset="0"/>
-              </a:rPr>
-              <a:t>GitHub</a:t>
-            </a:r>
-            <a:r>
-              <a:rPr lang="ro-RO" dirty="0">
-                <a:latin typeface="Times New Roman" pitchFamily="18" charset="0"/>
-                <a:cs typeface="Times New Roman" pitchFamily="18" charset="0"/>
-              </a:rPr>
-              <a:t>, disponibil: </a:t>
+              <a:t>Repository public de GitHub, disponibil: </a:t>
             </a:r>
             <a:r>
               <a:rPr lang="ro-RO" dirty="0">
@@ -5796,17 +6407,62 @@
                 <a:latin typeface="Times New Roman" pitchFamily="18" charset="0"/>
                 <a:cs typeface="Times New Roman" pitchFamily="18" charset="0"/>
               </a:rPr>
-              <a:t>Prezentarea arhitecturii soluției și a modului de implementare </a:t>
-            </a:r>
-          </a:p>
-          <a:p>
+              <a:t>Arhitectura</a:t>
+            </a:r>
+            <a:r>
+              <a:rPr lang="en-GB" dirty="0">
+                <a:latin typeface="Times New Roman" pitchFamily="18" charset="0"/>
+                <a:cs typeface="Times New Roman" pitchFamily="18" charset="0"/>
+              </a:rPr>
+              <a:t> </a:t>
+            </a:r>
             <a:r>
               <a:rPr lang="ro-RO" dirty="0">
                 <a:latin typeface="Times New Roman" pitchFamily="18" charset="0"/>
                 <a:cs typeface="Times New Roman" pitchFamily="18" charset="0"/>
               </a:rPr>
-              <a:t>Maxim 3 slide-uri</a:t>
-            </a:r>
+              <a:t>aplicației:</a:t>
+            </a:r>
+          </a:p>
+          <a:p>
+            <a:pPr lvl="1"/>
+            <a:r>
+              <a:rPr lang="ro-RO" dirty="0">
+                <a:latin typeface="Times New Roman" pitchFamily="18" charset="0"/>
+                <a:cs typeface="Times New Roman" pitchFamily="18" charset="0"/>
+              </a:rPr>
+              <a:t>Componenta UI;</a:t>
+            </a:r>
+          </a:p>
+          <a:p>
+            <a:pPr lvl="1"/>
+            <a:r>
+              <a:rPr lang="ro-RO" dirty="0">
+                <a:latin typeface="Times New Roman" pitchFamily="18" charset="0"/>
+                <a:cs typeface="Times New Roman" pitchFamily="18" charset="0"/>
+              </a:rPr>
+              <a:t>Componenta de validare;</a:t>
+            </a:r>
+          </a:p>
+          <a:p>
+            <a:pPr lvl="1"/>
+            <a:r>
+              <a:rPr lang="ro-RO" dirty="0">
+                <a:latin typeface="Times New Roman" pitchFamily="18" charset="0"/>
+                <a:cs typeface="Times New Roman" pitchFamily="18" charset="0"/>
+              </a:rPr>
+              <a:t>Componenta de extragere.</a:t>
+            </a:r>
+          </a:p>
+          <a:p>
+            <a:pPr lvl="1"/>
+            <a:endParaRPr lang="ro-RO" dirty="0">
+              <a:latin typeface="Times New Roman" pitchFamily="18" charset="0"/>
+              <a:cs typeface="Times New Roman" pitchFamily="18" charset="0"/>
+            </a:endParaRPr>
+          </a:p>
+          <a:p>
+            <a:pPr lvl="1"/>
             <a:endParaRPr lang="en-US" dirty="0">
               <a:latin typeface="Times New Roman" pitchFamily="18" charset="0"/>
               <a:cs typeface="Times New Roman" pitchFamily="18" charset="0"/>
@@ -5882,6 +6538,47 @@
           </a:p>
         </p:txBody>
       </p:sp>
+      <p:pic>
+        <p:nvPicPr>
+          <p:cNvPr id="4" name="Picture 3">
+            <a:extLst>
+              <a:ext uri="{FF2B5EF4-FFF2-40B4-BE49-F238E27FC236}">
+                <a16:creationId xmlns:a16="http://schemas.microsoft.com/office/drawing/2014/main" id="{CE789DFA-CDA9-3A31-6D35-64059026D714}"/>
+              </a:ext>
+            </a:extLst>
+          </p:cNvPr>
+          <p:cNvPicPr>
+            <a:picLocks noChangeAspect="1"/>
+          </p:cNvPicPr>
+          <p:nvPr/>
+        </p:nvPicPr>
+        <p:blipFill>
+          <a:blip r:embed="rId2">
+            <a:extLst>
+              <a:ext uri="{28A0092B-C50C-407E-A947-70E740481C1C}">
+                <a14:useLocalDpi xmlns:a14="http://schemas.microsoft.com/office/drawing/2010/main" val="0"/>
+              </a:ext>
+            </a:extLst>
+          </a:blip>
+          <a:srcRect/>
+          <a:stretch>
+            <a:fillRect/>
+          </a:stretch>
+        </p:blipFill>
+        <p:spPr bwMode="auto">
+          <a:xfrm>
+            <a:off x="1790700" y="3581400"/>
+            <a:ext cx="5562600" cy="1970405"/>
+          </a:xfrm>
+          <a:prstGeom prst="rect">
+            <a:avLst/>
+          </a:prstGeom>
+          <a:noFill/>
+          <a:ln>
+            <a:noFill/>
+          </a:ln>
+        </p:spPr>
+      </p:pic>
     </p:spTree>
     <p:extLst>
       <p:ext uri="{BB962C8B-B14F-4D97-AF65-F5344CB8AC3E}">
@@ -5935,7 +6632,7 @@
                 <a:latin typeface="Times New Roman" pitchFamily="18" charset="0"/>
                 <a:cs typeface="Times New Roman" pitchFamily="18" charset="0"/>
               </a:rPr>
-              <a:t>Tehnologii folosite</a:t>
+              <a:t>Descriere soluție (2)</a:t>
             </a:r>
             <a:endParaRPr lang="en-US" b="1" dirty="0">
               <a:solidFill>
@@ -5959,77 +6656,90 @@
         </p:nvSpPr>
         <p:spPr/>
         <p:txBody>
-          <a:bodyPr/>
-          <a:lstStyle/>
+          <a:bodyPr>
+            <a:normAutofit/>
+          </a:bodyPr>
+          <a:lstStyle/>
+          <a:p>
+            <a:endParaRPr lang="ro-RO" dirty="0">
+              <a:latin typeface="Times New Roman" pitchFamily="18" charset="0"/>
+              <a:cs typeface="Times New Roman" pitchFamily="18" charset="0"/>
+            </a:endParaRPr>
+          </a:p>
           <a:p>
             <a:r>
               <a:rPr lang="ro-RO" dirty="0">
                 <a:latin typeface="Times New Roman" pitchFamily="18" charset="0"/>
                 <a:cs typeface="Times New Roman" pitchFamily="18" charset="0"/>
               </a:rPr>
-              <a:t>Java;</a:t>
-            </a:r>
-          </a:p>
-          <a:p>
+              <a:t>Componenta de extragere:</a:t>
+            </a:r>
+          </a:p>
+          <a:p>
+            <a:endParaRPr lang="ro-RO" dirty="0">
+              <a:latin typeface="Times New Roman" pitchFamily="18" charset="0"/>
+              <a:cs typeface="Times New Roman" pitchFamily="18" charset="0"/>
+            </a:endParaRPr>
+          </a:p>
+          <a:p>
+            <a:pPr lvl="1"/>
             <a:r>
               <a:rPr lang="ro-RO" dirty="0">
                 <a:latin typeface="Times New Roman" pitchFamily="18" charset="0"/>
                 <a:cs typeface="Times New Roman" pitchFamily="18" charset="0"/>
               </a:rPr>
-              <a:t>Digital Signature Service (DSS </a:t>
-            </a:r>
-            <a:r>
-              <a:rPr lang="ro-RO" dirty="0" err="1">
-                <a:latin typeface="Times New Roman" pitchFamily="18" charset="0"/>
-                <a:cs typeface="Times New Roman" pitchFamily="18" charset="0"/>
-              </a:rPr>
-              <a:t>library</a:t>
-            </a:r>
+              <a:t>Contactează serverul oficial al comisiei Europene;</a:t>
+            </a:r>
+          </a:p>
+          <a:p>
+            <a:pPr lvl="1"/>
             <a:r>
               <a:rPr lang="ro-RO" dirty="0">
                 <a:latin typeface="Times New Roman" pitchFamily="18" charset="0"/>
                 <a:cs typeface="Times New Roman" pitchFamily="18" charset="0"/>
               </a:rPr>
-              <a:t>);</a:t>
-            </a:r>
-          </a:p>
-          <a:p>
+              <a:t>Efectuează validarea semnăturilor asupra listelor de încredere;</a:t>
+            </a:r>
+          </a:p>
+          <a:p>
+            <a:pPr lvl="1"/>
             <a:r>
               <a:rPr lang="ro-RO" dirty="0">
                 <a:latin typeface="Times New Roman" pitchFamily="18" charset="0"/>
                 <a:cs typeface="Times New Roman" pitchFamily="18" charset="0"/>
               </a:rPr>
-              <a:t>SpringBoot Framework (REST, Web MVC, IOC, Dependency Injection);</a:t>
-            </a:r>
-          </a:p>
-          <a:p>
+              <a:t>Extrage informațiile prezente în listele de încredere și le adaugă în memoria cache internă;</a:t>
+            </a:r>
+          </a:p>
+          <a:p>
+            <a:pPr lvl="1"/>
             <a:r>
               <a:rPr lang="ro-RO" dirty="0">
                 <a:latin typeface="Times New Roman" pitchFamily="18" charset="0"/>
                 <a:cs typeface="Times New Roman" pitchFamily="18" charset="0"/>
               </a:rPr>
-              <a:t>Thymeleaf;</a:t>
-            </a:r>
-          </a:p>
-          <a:p>
+              <a:t>Efectuează resincronizarea cache-ului la un interval de timp configurat pentru LOTL, și la cerere pentru fiecare TL;</a:t>
+            </a:r>
+          </a:p>
+          <a:p>
+            <a:pPr lvl="1"/>
             <a:r>
               <a:rPr lang="ro-RO" dirty="0">
                 <a:latin typeface="Times New Roman" pitchFamily="18" charset="0"/>
                 <a:cs typeface="Times New Roman" pitchFamily="18" charset="0"/>
               </a:rPr>
-              <a:t>Bootstrap;</a:t>
-            </a:r>
-          </a:p>
-          <a:p>
-            <a:r>
-              <a:rPr lang="ro-RO" dirty="0">
-                <a:latin typeface="Times New Roman" pitchFamily="18" charset="0"/>
-                <a:cs typeface="Times New Roman" pitchFamily="18" charset="0"/>
-              </a:rPr>
-              <a:t>HTML + CSS + JS.</a:t>
-            </a:r>
-          </a:p>
-          <a:p>
+              <a:t>Trimite informațiile din cache către componenta UI.</a:t>
+            </a:r>
+          </a:p>
+          <a:p>
+            <a:pPr lvl="1"/>
+            <a:endParaRPr lang="ro-RO" dirty="0">
+              <a:latin typeface="Times New Roman" pitchFamily="18" charset="0"/>
+              <a:cs typeface="Times New Roman" pitchFamily="18" charset="0"/>
+            </a:endParaRPr>
+          </a:p>
+          <a:p>
+            <a:pPr lvl="1"/>
             <a:endParaRPr lang="en-US" dirty="0">
               <a:latin typeface="Times New Roman" pitchFamily="18" charset="0"/>
               <a:cs typeface="Times New Roman" pitchFamily="18" charset="0"/>
@@ -6108,7 +6818,7 @@
     </p:spTree>
     <p:extLst>
       <p:ext uri="{BB962C8B-B14F-4D97-AF65-F5344CB8AC3E}">
-        <p14:creationId xmlns:p14="http://schemas.microsoft.com/office/powerpoint/2010/main" val="3439825583"/>
+        <p14:creationId xmlns:p14="http://schemas.microsoft.com/office/powerpoint/2010/main" val="162541886"/>
       </p:ext>
     </p:extLst>
   </p:cSld>
@@ -6158,7 +6868,7 @@
                 <a:latin typeface="Times New Roman" pitchFamily="18" charset="0"/>
                 <a:cs typeface="Times New Roman" pitchFamily="18" charset="0"/>
               </a:rPr>
-              <a:t>Rezultate testare</a:t>
+              <a:t>Descriere soluție (3)</a:t>
             </a:r>
             <a:endParaRPr lang="en-US" b="1" dirty="0">
               <a:solidFill>
@@ -6182,7 +6892,9 @@
         </p:nvSpPr>
         <p:spPr/>
         <p:txBody>
-          <a:bodyPr/>
+          <a:bodyPr>
+            <a:normAutofit/>
+          </a:bodyPr>
           <a:lstStyle/>
           <a:p>
             <a:r>
@@ -6190,8 +6902,14 @@
                 <a:latin typeface="Times New Roman" pitchFamily="18" charset="0"/>
                 <a:cs typeface="Times New Roman" pitchFamily="18" charset="0"/>
               </a:rPr>
-              <a:t>Metode de testare folosite:</a:t>
-            </a:r>
+              <a:t>Componenta de validare:</a:t>
+            </a:r>
+          </a:p>
+          <a:p>
+            <a:endParaRPr lang="ro-RO" dirty="0">
+              <a:latin typeface="Times New Roman" pitchFamily="18" charset="0"/>
+              <a:cs typeface="Times New Roman" pitchFamily="18" charset="0"/>
+            </a:endParaRPr>
           </a:p>
           <a:p>
             <a:pPr lvl="1"/>
@@ -6200,27 +6918,7 @@
                 <a:latin typeface="Times New Roman" pitchFamily="18" charset="0"/>
                 <a:cs typeface="Times New Roman" pitchFamily="18" charset="0"/>
               </a:rPr>
-              <a:t>Testare unitară</a:t>
-            </a:r>
-          </a:p>
-          <a:p>
-            <a:pPr lvl="1"/>
-            <a:r>
-              <a:rPr lang="ro-RO" dirty="0">
-                <a:latin typeface="Times New Roman" pitchFamily="18" charset="0"/>
-                <a:cs typeface="Times New Roman" pitchFamily="18" charset="0"/>
-              </a:rPr>
-              <a:t>Testare de integrare</a:t>
-            </a:r>
-          </a:p>
-          <a:p>
-            <a:pPr lvl="1"/>
-            <a:r>
-              <a:rPr lang="ro-RO" dirty="0">
-                <a:latin typeface="Times New Roman" pitchFamily="18" charset="0"/>
-                <a:cs typeface="Times New Roman" pitchFamily="18" charset="0"/>
-              </a:rPr>
-              <a:t>Testare closed-beta</a:t>
+              <a:t>Efectuează validările asupra fișierelor semnate primite de la componenta UI, colectează informații obținute în urma validării și le returnează acesteia;</a:t>
             </a:r>
           </a:p>
           <a:p>
@@ -6231,34 +6929,14 @@
             </a:endParaRPr>
           </a:p>
           <a:p>
+            <a:pPr lvl="1"/>
             <a:r>
               <a:rPr lang="ro-RO" dirty="0">
                 <a:latin typeface="Times New Roman" pitchFamily="18" charset="0"/>
                 <a:cs typeface="Times New Roman" pitchFamily="18" charset="0"/>
               </a:rPr>
-              <a:t>Performanțe generale mulțumitoare</a:t>
-            </a:r>
-          </a:p>
-          <a:p>
-            <a:endParaRPr lang="ro-RO" dirty="0">
-              <a:latin typeface="Times New Roman" pitchFamily="18" charset="0"/>
-              <a:cs typeface="Times New Roman" pitchFamily="18" charset="0"/>
-            </a:endParaRPr>
-          </a:p>
-          <a:p>
-            <a:r>
-              <a:rPr lang="ro-RO" dirty="0">
-                <a:latin typeface="Times New Roman" pitchFamily="18" charset="0"/>
-                <a:cs typeface="Times New Roman" pitchFamily="18" charset="0"/>
-              </a:rPr>
-              <a:t>Aplicația este ușor de folosit, nefiind întâlnite blocaje sau erori de către utilizatorii de test.</a:t>
-            </a:r>
-          </a:p>
-          <a:p>
-            <a:endParaRPr lang="ro-RO" dirty="0">
-              <a:latin typeface="Times New Roman" pitchFamily="18" charset="0"/>
-              <a:cs typeface="Times New Roman" pitchFamily="18" charset="0"/>
-            </a:endParaRPr>
+              <a:t>Efectuează validările asupra unui certificat digital primit de la componenta UI, la un moment de timp selectat de către utilizator, colectează informații obținute în urma validării și le returnează acesteia.</a:t>
+            </a:r>
           </a:p>
         </p:txBody>
       </p:sp>
@@ -6333,7 +7011,7 @@
     </p:spTree>
     <p:extLst>
       <p:ext uri="{BB962C8B-B14F-4D97-AF65-F5344CB8AC3E}">
-        <p14:creationId xmlns:p14="http://schemas.microsoft.com/office/powerpoint/2010/main" val="1329492536"/>
+        <p14:creationId xmlns:p14="http://schemas.microsoft.com/office/powerpoint/2010/main" val="2500951397"/>
       </p:ext>
     </p:extLst>
   </p:cSld>

</xml_diff>

<commit_message>
Lumanarea facec cam urat in camera asa ca salvez pentru orice eventualitate
Signed-off-by: Alin-Romeo Tudose <alintudose126@gmail.com>
</commit_message>
<xml_diff>
--- a/Documentatie/Prezentare_Disertatie_Tudose_Alin.pptx
+++ b/Documentatie/Prezentare_Disertatie_Tudose_Alin.pptx
@@ -281,7 +281,7 @@
           <a:p>
             <a:fld id="{DD5CEE04-040A-4E00-B740-BEBACC3B837A}" type="datetimeFigureOut">
               <a:rPr lang="en-US" smtClean="0"/>
-              <a:t>2/20/2023</a:t>
+              <a:t>2/21/2023</a:t>
             </a:fld>
             <a:endParaRPr lang="en-US" dirty="0"/>
           </a:p>
@@ -639,7 +639,7 @@
           <a:p>
             <a:fld id="{DD5CEE04-040A-4E00-B740-BEBACC3B837A}" type="datetimeFigureOut">
               <a:rPr lang="en-US" smtClean="0"/>
-              <a:t>2/20/2023</a:t>
+              <a:t>2/21/2023</a:t>
             </a:fld>
             <a:endParaRPr lang="en-US" dirty="0"/>
           </a:p>
@@ -813,7 +813,7 @@
           <a:p>
             <a:fld id="{DD5CEE04-040A-4E00-B740-BEBACC3B837A}" type="datetimeFigureOut">
               <a:rPr lang="en-US" smtClean="0"/>
-              <a:t>2/20/2023</a:t>
+              <a:t>2/21/2023</a:t>
             </a:fld>
             <a:endParaRPr lang="en-US" dirty="0"/>
           </a:p>
@@ -1328,7 +1328,7 @@
           <a:p>
             <a:fld id="{DD5CEE04-040A-4E00-B740-BEBACC3B837A}" type="datetimeFigureOut">
               <a:rPr lang="en-US" smtClean="0"/>
-              <a:t>2/20/2023</a:t>
+              <a:t>2/21/2023</a:t>
             </a:fld>
             <a:endParaRPr lang="en-US" dirty="0"/>
           </a:p>
@@ -1547,7 +1547,7 @@
           <a:p>
             <a:fld id="{DD5CEE04-040A-4E00-B740-BEBACC3B837A}" type="datetimeFigureOut">
               <a:rPr lang="en-US" smtClean="0"/>
-              <a:t>2/20/2023</a:t>
+              <a:t>2/21/2023</a:t>
             </a:fld>
             <a:endParaRPr lang="en-US" dirty="0"/>
           </a:p>
@@ -1898,7 +1898,7 @@
           <a:p>
             <a:fld id="{DD5CEE04-040A-4E00-B740-BEBACC3B837A}" type="datetimeFigureOut">
               <a:rPr lang="en-US" smtClean="0"/>
-              <a:t>2/20/2023</a:t>
+              <a:t>2/21/2023</a:t>
             </a:fld>
             <a:endParaRPr lang="en-US" dirty="0"/>
           </a:p>
@@ -2129,7 +2129,7 @@
           <a:p>
             <a:fld id="{DD5CEE04-040A-4E00-B740-BEBACC3B837A}" type="datetimeFigureOut">
               <a:rPr lang="en-US" smtClean="0"/>
-              <a:t>2/20/2023</a:t>
+              <a:t>2/21/2023</a:t>
             </a:fld>
             <a:endParaRPr lang="en-US" dirty="0"/>
           </a:p>
@@ -2269,7 +2269,7 @@
           <a:p>
             <a:fld id="{DD5CEE04-040A-4E00-B740-BEBACC3B837A}" type="datetimeFigureOut">
               <a:rPr lang="en-US" smtClean="0"/>
-              <a:t>2/20/2023</a:t>
+              <a:t>2/21/2023</a:t>
             </a:fld>
             <a:endParaRPr lang="en-US" dirty="0"/>
           </a:p>
@@ -2545,7 +2545,7 @@
           <a:p>
             <a:fld id="{DD5CEE04-040A-4E00-B740-BEBACC3B837A}" type="datetimeFigureOut">
               <a:rPr lang="en-US" smtClean="0"/>
-              <a:t>2/20/2023</a:t>
+              <a:t>2/21/2023</a:t>
             </a:fld>
             <a:endParaRPr lang="en-US" dirty="0"/>
           </a:p>
@@ -2950,7 +2950,7 @@
           <a:p>
             <a:fld id="{DD5CEE04-040A-4E00-B740-BEBACC3B837A}" type="datetimeFigureOut">
               <a:rPr lang="en-US" smtClean="0"/>
-              <a:t>2/20/2023</a:t>
+              <a:t>2/21/2023</a:t>
             </a:fld>
             <a:endParaRPr lang="en-US" dirty="0"/>
           </a:p>
@@ -3286,7 +3286,7 @@
           <a:p>
             <a:fld id="{DD5CEE04-040A-4E00-B740-BEBACC3B837A}" type="datetimeFigureOut">
               <a:rPr lang="en-US" smtClean="0"/>
-              <a:t>2/20/2023</a:t>
+              <a:t>2/21/2023</a:t>
             </a:fld>
             <a:endParaRPr lang="en-US" dirty="0"/>
           </a:p>
@@ -5556,8 +5556,43 @@
         </p:nvSpPr>
         <p:spPr/>
         <p:txBody>
-          <a:bodyPr/>
-          <a:lstStyle/>
+          <a:bodyPr>
+            <a:normAutofit lnSpcReduction="10000"/>
+          </a:bodyPr>
+          <a:lstStyle/>
+          <a:p>
+            <a:r>
+              <a:rPr lang="ro-RO" dirty="0">
+                <a:latin typeface="Times New Roman" pitchFamily="18" charset="0"/>
+                <a:cs typeface="Times New Roman" pitchFamily="18" charset="0"/>
+              </a:rPr>
+              <a:t>Familiarizarea</a:t>
+            </a:r>
+            <a:r>
+              <a:rPr lang="en-GB" dirty="0">
+                <a:latin typeface="Times New Roman" pitchFamily="18" charset="0"/>
+                <a:cs typeface="Times New Roman" pitchFamily="18" charset="0"/>
+              </a:rPr>
+              <a:t> </a:t>
+            </a:r>
+            <a:r>
+              <a:rPr lang="ro-RO" dirty="0">
+                <a:latin typeface="Times New Roman" pitchFamily="18" charset="0"/>
+                <a:cs typeface="Times New Roman" pitchFamily="18" charset="0"/>
+              </a:rPr>
+              <a:t>cu listele de încredere, modul lor de funcționare, și informațiile vehiculate în cadrul acestora;</a:t>
+            </a:r>
+            <a:endParaRPr lang="en-GB" dirty="0">
+              <a:latin typeface="Times New Roman" pitchFamily="18" charset="0"/>
+              <a:cs typeface="Times New Roman" pitchFamily="18" charset="0"/>
+            </a:endParaRPr>
+          </a:p>
+          <a:p>
+            <a:endParaRPr lang="ro-RO" dirty="0">
+              <a:latin typeface="Times New Roman" pitchFamily="18" charset="0"/>
+              <a:cs typeface="Times New Roman" pitchFamily="18" charset="0"/>
+            </a:endParaRPr>
+          </a:p>
           <a:p>
             <a:r>
               <a:rPr lang="ro-RO" dirty="0">

</xml_diff>